<commit_message>
Mergesort applications with counting inversions
</commit_message>
<xml_diff>
--- a/Slides/2020-Even-DAA-L11-Divide-Conquer-MergeSort.pptx
+++ b/Slides/2020-Even-DAA-L11-Divide-Conquer-MergeSort.pptx
@@ -23,6 +23,8 @@
     <p:sldId id="268" r:id="rId20"/>
     <p:sldId id="269" r:id="rId21"/>
     <p:sldId id="270" r:id="rId22"/>
+    <p:sldId id="271" r:id="rId23"/>
+    <p:sldId id="272" r:id="rId24"/>
   </p:sldIdLst>
   <p:sldSz cx="10160000" cy="7620000"/>
   <p:notesSz cx="6858000" cy="9144000"/>
@@ -4648,7 +4650,7 @@
               </a:defRPr>
             </a:pPr>
             <a:r>
-              <a:t>a=2 (a≥1), b=2(b≥2), c=T(1)=0,</a:t>
+              <a:t>a=2 (a≥1), b=2(b≥2), c=T(1)=1,</a:t>
             </a:r>
             <a:r>
               <a:rPr>
@@ -5174,8 +5176,8 @@
       </p:par>
     </p:tnLst>
     <p:bldLst>
+      <p:bldP build="p" bldLvl="5" animBg="1" rev="0" advAuto="0" spid="216" grpId="2"/>
       <p:bldP build="whole" bldLvl="1" animBg="1" rev="0" advAuto="0" spid="214" grpId="1"/>
-      <p:bldP build="p" bldLvl="5" animBg="1" rev="0" advAuto="0" spid="216" grpId="2"/>
     </p:bldLst>
   </p:timing>
 </p:sld>
@@ -9418,36 +9420,36 @@
       </p:par>
     </p:tnLst>
     <p:bldLst>
+      <p:bldP build="whole" bldLvl="1" animBg="1" rev="0" advAuto="0" spid="229" grpId="4"/>
+      <p:bldP build="whole" bldLvl="1" animBg="1" rev="0" advAuto="0" spid="268" grpId="25"/>
+      <p:bldP build="whole" bldLvl="1" animBg="1" rev="0" advAuto="0" spid="262" grpId="28"/>
+      <p:bldP build="whole" bldLvl="1" animBg="1" rev="0" advAuto="0" spid="249" grpId="15"/>
+      <p:bldP build="whole" bldLvl="1" animBg="1" rev="0" advAuto="0" spid="261" grpId="26"/>
+      <p:bldP build="whole" bldLvl="1" animBg="1" rev="0" advAuto="0" spid="252" grpId="20"/>
+      <p:bldP build="whole" bldLvl="1" animBg="1" rev="0" advAuto="0" spid="259" grpId="21"/>
+      <p:bldP build="p" bldLvl="5" animBg="1" rev="0" advAuto="0" spid="225" grpId="1"/>
+      <p:bldP build="whole" bldLvl="1" animBg="1" rev="0" advAuto="0" spid="251" grpId="19"/>
+      <p:bldP build="whole" bldLvl="1" animBg="1" rev="0" advAuto="0" spid="283" grpId="30"/>
+      <p:bldP build="whole" bldLvl="1" animBg="1" rev="0" advAuto="0" spid="260" grpId="29"/>
+      <p:bldP build="whole" bldLvl="1" animBg="1" rev="0" advAuto="0" spid="233" grpId="7"/>
+      <p:bldP build="whole" bldLvl="1" animBg="1" rev="0" advAuto="0" spid="280" grpId="10"/>
+      <p:bldP build="whole" bldLvl="1" animBg="1" rev="0" advAuto="0" spid="250" grpId="22"/>
+      <p:bldP build="whole" bldLvl="1" animBg="1" rev="0" advAuto="0" spid="269" grpId="27"/>
+      <p:bldP build="whole" bldLvl="1" animBg="1" rev="0" advAuto="0" spid="281" grpId="17"/>
+      <p:bldP build="whole" bldLvl="1" animBg="1" rev="0" advAuto="0" spid="230" grpId="5"/>
+      <p:bldP build="whole" bldLvl="1" animBg="1" rev="0" advAuto="0" spid="232" grpId="9"/>
+      <p:bldP build="whole" bldLvl="1" animBg="1" rev="0" advAuto="0" spid="238" grpId="3"/>
+      <p:bldP build="whole" bldLvl="1" animBg="1" rev="0" advAuto="0" spid="246" grpId="16"/>
+      <p:bldP build="whole" bldLvl="1" animBg="1" rev="0" advAuto="0" spid="245" grpId="14"/>
       <p:bldP build="whole" bldLvl="1" animBg="1" rev="0" advAuto="0" spid="231" grpId="6"/>
+      <p:bldP build="whole" bldLvl="1" animBg="1" rev="0" advAuto="0" spid="244" grpId="13"/>
+      <p:bldP build="whole" bldLvl="1" animBg="1" rev="0" advAuto="0" spid="242" grpId="11"/>
       <p:bldP build="whole" bldLvl="1" animBg="1" rev="0" advAuto="0" spid="237" grpId="8"/>
-      <p:bldP build="whole" bldLvl="1" animBg="1" rev="0" advAuto="0" spid="246" grpId="16"/>
-      <p:bldP build="whole" bldLvl="1" animBg="1" rev="0" advAuto="0" spid="252" grpId="20"/>
       <p:bldP build="whole" bldLvl="1" animBg="1" rev="0" advAuto="0" spid="243" grpId="12"/>
-      <p:bldP build="whole" bldLvl="1" animBg="1" rev="0" advAuto="0" spid="250" grpId="22"/>
-      <p:bldP build="whole" bldLvl="1" animBg="1" rev="0" advAuto="0" spid="268" grpId="25"/>
-      <p:bldP build="whole" bldLvl="1" animBg="1" rev="0" advAuto="0" spid="260" grpId="29"/>
-      <p:bldP build="whole" bldLvl="1" animBg="1" rev="0" advAuto="0" spid="281" grpId="17"/>
+      <p:bldP build="whole" bldLvl="1" animBg="1" rev="0" advAuto="0" spid="253" grpId="23"/>
       <p:bldP build="whole" bldLvl="1" animBg="1" rev="0" advAuto="0" spid="258" grpId="18"/>
-      <p:bldP build="whole" bldLvl="1" animBg="1" rev="0" advAuto="0" spid="269" grpId="27"/>
-      <p:bldP build="whole" bldLvl="1" animBg="1" rev="0" advAuto="0" spid="261" grpId="26"/>
-      <p:bldP build="whole" bldLvl="1" animBg="1" rev="0" advAuto="0" spid="230" grpId="5"/>
-      <p:bldP build="whole" bldLvl="1" animBg="1" rev="0" advAuto="0" spid="251" grpId="19"/>
-      <p:bldP build="whole" bldLvl="1" animBg="1" rev="0" advAuto="0" spid="245" grpId="14"/>
-      <p:bldP build="whole" bldLvl="1" animBg="1" rev="0" advAuto="0" spid="244" grpId="13"/>
-      <p:bldP build="whole" bldLvl="1" animBg="1" rev="0" advAuto="0" spid="233" grpId="7"/>
-      <p:bldP build="whole" bldLvl="1" animBg="1" rev="0" advAuto="0" spid="229" grpId="4"/>
-      <p:bldP build="whole" bldLvl="1" animBg="1" rev="0" advAuto="0" spid="280" grpId="10"/>
-      <p:bldP build="whole" bldLvl="1" animBg="1" rev="0" advAuto="0" spid="262" grpId="28"/>
-      <p:bldP build="whole" bldLvl="1" animBg="1" rev="0" advAuto="0" spid="283" grpId="30"/>
-      <p:bldP build="whole" bldLvl="1" animBg="1" rev="0" advAuto="0" spid="232" grpId="9"/>
+      <p:bldP build="whole" bldLvl="1" animBg="1" rev="0" advAuto="0" spid="282" grpId="24"/>
       <p:bldP build="whole" bldLvl="1" animBg="1" rev="0" advAuto="0" spid="279" grpId="2"/>
-      <p:bldP build="whole" bldLvl="1" animBg="1" rev="0" advAuto="0" spid="282" grpId="24"/>
-      <p:bldP build="whole" bldLvl="1" animBg="1" rev="0" advAuto="0" spid="242" grpId="11"/>
-      <p:bldP build="whole" bldLvl="1" animBg="1" rev="0" advAuto="0" spid="249" grpId="15"/>
-      <p:bldP build="whole" bldLvl="1" animBg="1" rev="0" advAuto="0" spid="238" grpId="3"/>
-      <p:bldP build="whole" bldLvl="1" animBg="1" rev="0" advAuto="0" spid="259" grpId="21"/>
-      <p:bldP build="whole" bldLvl="1" animBg="1" rev="0" advAuto="0" spid="253" grpId="23"/>
-      <p:bldP build="p" bldLvl="5" animBg="1" rev="0" advAuto="0" spid="225" grpId="1"/>
     </p:bldLst>
   </p:timing>
 </p:sld>
@@ -10302,6 +10304,845 @@
       <p:sp>
         <p:nvSpPr>
           <p:cNvPr id="295" name="RPR/"/>
+          <p:cNvSpPr txBox="1"/>
+          <p:nvPr/>
+        </p:nvSpPr>
+        <p:spPr>
+          <a:xfrm>
+            <a:off x="7535212" y="6988206"/>
+            <a:ext cx="705605" cy="382910"/>
+          </a:xfrm>
+          <a:prstGeom prst="rect">
+            <a:avLst/>
+          </a:prstGeom>
+          <a:ln w="12700">
+            <a:miter lim="400000"/>
+          </a:ln>
+          <a:extLst>
+            <a:ext uri="{C572A759-6A51-4108-AA02-DFA0A04FC94B}">
+              <ma14:wrappingTextBoxFlag xmlns:ma14="http://schemas.microsoft.com/office/mac/drawingml/2011/main" val="1"/>
+            </a:ext>
+          </a:extLst>
+        </p:spPr>
+        <p:txBody>
+          <a:bodyPr wrap="none" lIns="50800" tIns="50800" rIns="50800" bIns="50800" anchor="ctr">
+            <a:spAutoFit/>
+          </a:bodyPr>
+          <a:lstStyle>
+            <a:lvl1pPr>
+              <a:defRPr sz="2000"/>
+            </a:lvl1pPr>
+          </a:lstStyle>
+          <a:p>
+            <a:pPr/>
+            <a:r>
+              <a:t>RPR/</a:t>
+            </a:r>
+          </a:p>
+        </p:txBody>
+      </p:sp>
+    </p:spTree>
+  </p:cSld>
+  <p:clrMapOvr>
+    <a:masterClrMapping/>
+  </p:clrMapOvr>
+  <p:transition xmlns:p14="http://schemas.microsoft.com/office/powerpoint/2010/main" spd="med" advClick="1"/>
+</p:sld>
+</file>
+
+<file path=ppt/slides/slide16.xml><?xml version="1.0" encoding="utf-8"?>
+<p:sld xmlns:a="http://schemas.openxmlformats.org/drawingml/2006/main" xmlns:r="http://schemas.openxmlformats.org/officeDocument/2006/relationships" xmlns:p="http://schemas.openxmlformats.org/presentationml/2006/main" xmlns:m="http://schemas.openxmlformats.org/officeDocument/2006/math" xmlns:a14="http://schemas.microsoft.com/office/drawing/2010/main" showMasterSp="1" showMasterPhAnim="1">
+  <p:cSld>
+    <p:spTree>
+      <p:nvGrpSpPr>
+        <p:cNvPr id="1" name=""/>
+        <p:cNvGrpSpPr/>
+        <p:nvPr/>
+      </p:nvGrpSpPr>
+      <p:grpSpPr>
+        <a:xfrm>
+          <a:off x="0" y="0"/>
+          <a:ext cx="0" cy="0"/>
+          <a:chOff x="0" y="0"/>
+          <a:chExt cx="0" cy="0"/>
+        </a:xfrm>
+      </p:grpSpPr>
+      <p:sp>
+        <p:nvSpPr>
+          <p:cNvPr id="297" name="Count Inversions"/>
+          <p:cNvSpPr txBox="1"/>
+          <p:nvPr>
+            <p:ph type="title"/>
+          </p:nvPr>
+        </p:nvSpPr>
+        <p:spPr>
+          <a:prstGeom prst="rect">
+            <a:avLst/>
+          </a:prstGeom>
+        </p:spPr>
+        <p:txBody>
+          <a:bodyPr/>
+          <a:lstStyle/>
+          <a:p>
+            <a:pPr/>
+            <a:r>
+              <a:t>Count Inversions</a:t>
+            </a:r>
+          </a:p>
+        </p:txBody>
+      </p:sp>
+      <p:sp>
+        <p:nvSpPr>
+          <p:cNvPr id="298" name="Applications of Mergesort…"/>
+          <p:cNvSpPr txBox="1"/>
+          <p:nvPr>
+            <p:ph type="body" idx="1"/>
+          </p:nvPr>
+        </p:nvSpPr>
+        <p:spPr>
+          <a:prstGeom prst="rect">
+            <a:avLst/>
+          </a:prstGeom>
+        </p:spPr>
+        <p:txBody>
+          <a:bodyPr/>
+          <a:lstStyle/>
+          <a:p>
+            <a:pPr>
+              <a:spcBef>
+                <a:spcPts val="100"/>
+              </a:spcBef>
+            </a:pPr>
+            <a:r>
+              <a:t>Applications of Mergesort</a:t>
+            </a:r>
+          </a:p>
+          <a:p>
+            <a:pPr>
+              <a:spcBef>
+                <a:spcPts val="100"/>
+              </a:spcBef>
+            </a:pPr>
+            <a:r>
+              <a:t>An inversion is defined as </a:t>
+            </a:r>
+            <a:r>
+              <a:rPr>
+                <a:latin typeface="Courier New"/>
+                <a:ea typeface="Courier New"/>
+                <a:cs typeface="Courier New"/>
+                <a:sym typeface="Courier New"/>
+              </a:rPr>
+              <a:t>A[i]&gt;A[j]</a:t>
+            </a:r>
+            <a:r>
+              <a:t> if </a:t>
+            </a:r>
+            <a:r>
+              <a:rPr>
+                <a:latin typeface="Courier New"/>
+                <a:ea typeface="Courier New"/>
+                <a:cs typeface="Courier New"/>
+                <a:sym typeface="Courier New"/>
+              </a:rPr>
+              <a:t>i&lt;j</a:t>
+            </a:r>
+            <a:r>
+              <a:t>.</a:t>
+            </a:r>
+          </a:p>
+          <a:p>
+            <a:pPr>
+              <a:spcBef>
+                <a:spcPts val="100"/>
+              </a:spcBef>
+            </a:pPr>
+            <a:r>
+              <a:t>Consider the array</a:t>
+            </a:r>
+          </a:p>
+          <a:p>
+            <a:pPr lvl="1" marL="0" indent="228600">
+              <a:spcBef>
+                <a:spcPts val="100"/>
+              </a:spcBef>
+              <a:buSzTx/>
+              <a:buNone/>
+              <a:defRPr>
+                <a:latin typeface="Courier New"/>
+                <a:ea typeface="Courier New"/>
+                <a:cs typeface="Courier New"/>
+                <a:sym typeface="Courier New"/>
+              </a:defRPr>
+            </a:pPr>
+            <a:r>
+              <a:t>24, 9, 31, 2, 13, 36, 28, 7</a:t>
+            </a:r>
+          </a:p>
+          <a:p>
+            <a:pPr>
+              <a:spcBef>
+                <a:spcPts val="100"/>
+              </a:spcBef>
+            </a:pPr>
+            <a:r>
+              <a:t>Inversions are</a:t>
+            </a:r>
+          </a:p>
+          <a:p>
+            <a:pPr lvl="3" marL="0" indent="685800">
+              <a:spcBef>
+                <a:spcPts val="100"/>
+              </a:spcBef>
+              <a:buSzTx/>
+              <a:buNone/>
+              <a:defRPr sz="3000">
+                <a:latin typeface="Courier New"/>
+                <a:ea typeface="Courier New"/>
+                <a:cs typeface="Courier New"/>
+                <a:sym typeface="Courier New"/>
+              </a:defRPr>
+            </a:pPr>
+            <a:r>
+              <a:t>24-2, 24-2, 24-13, 24-7</a:t>
+            </a:r>
+          </a:p>
+          <a:p>
+            <a:pPr lvl="3" marL="0" indent="685800">
+              <a:spcBef>
+                <a:spcPts val="100"/>
+              </a:spcBef>
+              <a:buSzTx/>
+              <a:buNone/>
+              <a:defRPr sz="3000">
+                <a:latin typeface="Courier New"/>
+                <a:ea typeface="Courier New"/>
+                <a:cs typeface="Courier New"/>
+                <a:sym typeface="Courier New"/>
+              </a:defRPr>
+            </a:pPr>
+            <a:r>
+              <a:t>9-2, 9-7</a:t>
+            </a:r>
+          </a:p>
+          <a:p>
+            <a:pPr lvl="3" marL="0" indent="685800">
+              <a:spcBef>
+                <a:spcPts val="100"/>
+              </a:spcBef>
+              <a:buSzTx/>
+              <a:buNone/>
+              <a:defRPr sz="3000">
+                <a:latin typeface="Courier New"/>
+                <a:ea typeface="Courier New"/>
+                <a:cs typeface="Courier New"/>
+                <a:sym typeface="Courier New"/>
+              </a:defRPr>
+            </a:pPr>
+            <a:r>
+              <a:t>31-2, 31-13, 31-28, 31-7</a:t>
+            </a:r>
+          </a:p>
+          <a:p>
+            <a:pPr lvl="3" marL="0" indent="685800">
+              <a:spcBef>
+                <a:spcPts val="100"/>
+              </a:spcBef>
+              <a:buSzTx/>
+              <a:buNone/>
+              <a:defRPr sz="3000">
+                <a:latin typeface="Courier New"/>
+                <a:ea typeface="Courier New"/>
+                <a:cs typeface="Courier New"/>
+                <a:sym typeface="Courier New"/>
+              </a:defRPr>
+            </a:pPr>
+            <a:r>
+              <a:t>13-7</a:t>
+            </a:r>
+          </a:p>
+          <a:p>
+            <a:pPr lvl="3" marL="0" indent="685800">
+              <a:spcBef>
+                <a:spcPts val="100"/>
+              </a:spcBef>
+              <a:buSzTx/>
+              <a:buNone/>
+              <a:defRPr sz="3000">
+                <a:latin typeface="Courier New"/>
+                <a:ea typeface="Courier New"/>
+                <a:cs typeface="Courier New"/>
+                <a:sym typeface="Courier New"/>
+              </a:defRPr>
+            </a:pPr>
+            <a:r>
+              <a:t>36-28, 36-7</a:t>
+            </a:r>
+          </a:p>
+          <a:p>
+            <a:pPr lvl="3" marL="0" indent="685800">
+              <a:spcBef>
+                <a:spcPts val="100"/>
+              </a:spcBef>
+              <a:buSzTx/>
+              <a:buNone/>
+              <a:defRPr sz="3000">
+                <a:latin typeface="Courier New"/>
+                <a:ea typeface="Courier New"/>
+                <a:cs typeface="Courier New"/>
+                <a:sym typeface="Courier New"/>
+              </a:defRPr>
+            </a:pPr>
+            <a:r>
+              <a:t>28-7</a:t>
+            </a:r>
+          </a:p>
+          <a:p>
+            <a:pPr marL="361156" indent="-321468">
+              <a:spcBef>
+                <a:spcPts val="100"/>
+              </a:spcBef>
+              <a:defRPr sz="3000">
+                <a:latin typeface="Gill Sans MT"/>
+                <a:ea typeface="Gill Sans MT"/>
+                <a:cs typeface="Gill Sans MT"/>
+                <a:sym typeface="Gill Sans MT"/>
+              </a:defRPr>
+            </a:pPr>
+            <a:r>
+              <a:t>Total inversions: </a:t>
+            </a:r>
+            <a:r>
+              <a:rPr>
+                <a:latin typeface="Courier New"/>
+                <a:ea typeface="Courier New"/>
+                <a:cs typeface="Courier New"/>
+                <a:sym typeface="Courier New"/>
+              </a:rPr>
+              <a:t>14</a:t>
+            </a:r>
+          </a:p>
+          <a:p>
+            <a:pPr marL="361156" indent="-321468">
+              <a:spcBef>
+                <a:spcPts val="100"/>
+              </a:spcBef>
+              <a:defRPr sz="3000">
+                <a:latin typeface="Gill Sans MT"/>
+                <a:ea typeface="Gill Sans MT"/>
+                <a:cs typeface="Gill Sans MT"/>
+                <a:sym typeface="Gill Sans MT"/>
+              </a:defRPr>
+            </a:pPr>
+            <a:r>
+              <a:t>Use Merge and count approach (Divide &amp; Conq)</a:t>
+            </a:r>
+          </a:p>
+        </p:txBody>
+      </p:sp>
+      <p:sp>
+        <p:nvSpPr>
+          <p:cNvPr id="299" name="Slide Number"/>
+          <p:cNvSpPr txBox="1"/>
+          <p:nvPr>
+            <p:ph type="sldNum" sz="quarter" idx="2"/>
+          </p:nvPr>
+        </p:nvSpPr>
+        <p:spPr>
+          <a:prstGeom prst="rect">
+            <a:avLst/>
+          </a:prstGeom>
+          <a:extLst>
+            <a:ext uri="{C572A759-6A51-4108-AA02-DFA0A04FC94B}">
+              <ma14:wrappingTextBoxFlag xmlns:ma14="http://schemas.microsoft.com/office/mac/drawingml/2011/main" val="1"/>
+            </a:ext>
+          </a:extLst>
+        </p:spPr>
+        <p:txBody>
+          <a:bodyPr/>
+          <a:lstStyle/>
+          <a:p>
+            <a:pPr/>
+            <a:fld id="{86CB4B4D-7CA3-9044-876B-883B54F8677D}" type="slidenum"/>
+          </a:p>
+        </p:txBody>
+      </p:sp>
+      <p:sp>
+        <p:nvSpPr>
+          <p:cNvPr id="300" name="DAA/Divide and Conquer"/>
+          <p:cNvSpPr txBox="1"/>
+          <p:nvPr/>
+        </p:nvSpPr>
+        <p:spPr>
+          <a:xfrm>
+            <a:off x="423212" y="6963885"/>
+            <a:ext cx="3371712" cy="431552"/>
+          </a:xfrm>
+          <a:prstGeom prst="rect">
+            <a:avLst/>
+          </a:prstGeom>
+          <a:ln w="12700">
+            <a:miter lim="400000"/>
+          </a:ln>
+          <a:extLst>
+            <a:ext uri="{C572A759-6A51-4108-AA02-DFA0A04FC94B}">
+              <ma14:wrappingTextBoxFlag xmlns:ma14="http://schemas.microsoft.com/office/mac/drawingml/2011/main" val="1"/>
+            </a:ext>
+          </a:extLst>
+        </p:spPr>
+        <p:txBody>
+          <a:bodyPr wrap="none" lIns="50800" tIns="50800" rIns="50800" bIns="50800" anchor="ctr">
+            <a:spAutoFit/>
+          </a:bodyPr>
+          <a:lstStyle>
+            <a:lvl1pPr>
+              <a:defRPr sz="2400"/>
+            </a:lvl1pPr>
+          </a:lstStyle>
+          <a:p>
+            <a:pPr/>
+            <a:r>
+              <a:t>DAA/Divide and Conquer</a:t>
+            </a:r>
+          </a:p>
+        </p:txBody>
+      </p:sp>
+      <p:sp>
+        <p:nvSpPr>
+          <p:cNvPr id="301" name="RPR/"/>
+          <p:cNvSpPr txBox="1"/>
+          <p:nvPr/>
+        </p:nvSpPr>
+        <p:spPr>
+          <a:xfrm>
+            <a:off x="7535212" y="6988206"/>
+            <a:ext cx="705605" cy="382910"/>
+          </a:xfrm>
+          <a:prstGeom prst="rect">
+            <a:avLst/>
+          </a:prstGeom>
+          <a:ln w="12700">
+            <a:miter lim="400000"/>
+          </a:ln>
+          <a:extLst>
+            <a:ext uri="{C572A759-6A51-4108-AA02-DFA0A04FC94B}">
+              <ma14:wrappingTextBoxFlag xmlns:ma14="http://schemas.microsoft.com/office/mac/drawingml/2011/main" val="1"/>
+            </a:ext>
+          </a:extLst>
+        </p:spPr>
+        <p:txBody>
+          <a:bodyPr wrap="none" lIns="50800" tIns="50800" rIns="50800" bIns="50800" anchor="ctr">
+            <a:spAutoFit/>
+          </a:bodyPr>
+          <a:lstStyle>
+            <a:lvl1pPr>
+              <a:defRPr sz="2000"/>
+            </a:lvl1pPr>
+          </a:lstStyle>
+          <a:p>
+            <a:pPr/>
+            <a:r>
+              <a:t>RPR/</a:t>
+            </a:r>
+          </a:p>
+        </p:txBody>
+      </p:sp>
+    </p:spTree>
+  </p:cSld>
+  <p:clrMapOvr>
+    <a:masterClrMapping/>
+  </p:clrMapOvr>
+  <p:transition xmlns:p14="http://schemas.microsoft.com/office/powerpoint/2010/main" spd="med" advClick="1"/>
+</p:sld>
+</file>
+
+<file path=ppt/slides/slide17.xml><?xml version="1.0" encoding="utf-8"?>
+<p:sld xmlns:a="http://schemas.openxmlformats.org/drawingml/2006/main" xmlns:r="http://schemas.openxmlformats.org/officeDocument/2006/relationships" xmlns:p="http://schemas.openxmlformats.org/presentationml/2006/main" xmlns:m="http://schemas.openxmlformats.org/officeDocument/2006/math" xmlns:a14="http://schemas.microsoft.com/office/drawing/2010/main" showMasterSp="1" showMasterPhAnim="1">
+  <p:cSld>
+    <p:spTree>
+      <p:nvGrpSpPr>
+        <p:cNvPr id="1" name=""/>
+        <p:cNvGrpSpPr/>
+        <p:nvPr/>
+      </p:nvGrpSpPr>
+      <p:grpSpPr>
+        <a:xfrm>
+          <a:off x="0" y="0"/>
+          <a:ext cx="0" cy="0"/>
+          <a:chOff x="0" y="0"/>
+          <a:chExt cx="0" cy="0"/>
+        </a:xfrm>
+      </p:grpSpPr>
+      <p:sp>
+        <p:nvSpPr>
+          <p:cNvPr id="303" name="Count Inversions"/>
+          <p:cNvSpPr txBox="1"/>
+          <p:nvPr>
+            <p:ph type="title"/>
+          </p:nvPr>
+        </p:nvSpPr>
+        <p:spPr>
+          <a:prstGeom prst="rect">
+            <a:avLst/>
+          </a:prstGeom>
+        </p:spPr>
+        <p:txBody>
+          <a:bodyPr/>
+          <a:lstStyle/>
+          <a:p>
+            <a:pPr/>
+            <a:r>
+              <a:t>Count Inversions</a:t>
+            </a:r>
+          </a:p>
+        </p:txBody>
+      </p:sp>
+      <p:sp>
+        <p:nvSpPr>
+          <p:cNvPr id="304" name="Consider the array…"/>
+          <p:cNvSpPr txBox="1"/>
+          <p:nvPr>
+            <p:ph type="body" idx="1"/>
+          </p:nvPr>
+        </p:nvSpPr>
+        <p:spPr>
+          <a:xfrm>
+            <a:off x="887784" y="938113"/>
+            <a:ext cx="8964025" cy="5891610"/>
+          </a:xfrm>
+          <a:prstGeom prst="rect">
+            <a:avLst/>
+          </a:prstGeom>
+        </p:spPr>
+        <p:txBody>
+          <a:bodyPr/>
+          <a:lstStyle/>
+          <a:p>
+            <a:pPr>
+              <a:spcBef>
+                <a:spcPts val="100"/>
+              </a:spcBef>
+            </a:pPr>
+            <a:r>
+              <a:t>Consider the array</a:t>
+            </a:r>
+          </a:p>
+          <a:p>
+            <a:pPr lvl="1" marL="0" indent="228600">
+              <a:spcBef>
+                <a:spcPts val="100"/>
+              </a:spcBef>
+              <a:buSzTx/>
+              <a:buNone/>
+              <a:defRPr>
+                <a:latin typeface="Courier New"/>
+                <a:ea typeface="Courier New"/>
+                <a:cs typeface="Courier New"/>
+                <a:sym typeface="Courier New"/>
+              </a:defRPr>
+            </a:pPr>
+            <a:r>
+              <a:t>24, 9, 31, 2, 13, 36, 28, 7</a:t>
+            </a:r>
+          </a:p>
+          <a:p>
+            <a:pPr>
+              <a:spcBef>
+                <a:spcPts val="100"/>
+              </a:spcBef>
+            </a:pPr>
+            <a:r>
+              <a:t>Inversions in Left half: </a:t>
+            </a:r>
+            <a:r>
+              <a:rPr>
+                <a:latin typeface="Courier New"/>
+                <a:ea typeface="Courier New"/>
+                <a:cs typeface="Courier New"/>
+                <a:sym typeface="Courier New"/>
+              </a:rPr>
+              <a:t>24, 9, 31, 2</a:t>
+            </a:r>
+            <a:endParaRPr>
+              <a:latin typeface="Courier New"/>
+              <a:ea typeface="Courier New"/>
+              <a:cs typeface="Courier New"/>
+              <a:sym typeface="Courier New"/>
+            </a:endParaRPr>
+          </a:p>
+          <a:p>
+            <a:pPr lvl="2" marL="0" indent="457200">
+              <a:spcBef>
+                <a:spcPts val="100"/>
+              </a:spcBef>
+              <a:buSzTx/>
+              <a:buNone/>
+              <a:defRPr sz="3200">
+                <a:latin typeface="Courier New"/>
+                <a:ea typeface="Courier New"/>
+                <a:cs typeface="Courier New"/>
+                <a:sym typeface="Courier New"/>
+              </a:defRPr>
+            </a:pPr>
+            <a:r>
+              <a:t>(4): </a:t>
+            </a:r>
+            <a:r>
+              <a:t>24-31, 24-2, 9-2, 31-2</a:t>
+            </a:r>
+          </a:p>
+          <a:p>
+            <a:pPr lvl="2" marL="0" indent="457200">
+              <a:spcBef>
+                <a:spcPts val="100"/>
+              </a:spcBef>
+              <a:buSzTx/>
+              <a:buNone/>
+              <a:defRPr sz="3200">
+                <a:latin typeface="Courier New"/>
+                <a:ea typeface="Courier New"/>
+                <a:cs typeface="Courier New"/>
+                <a:sym typeface="Courier New"/>
+              </a:defRPr>
+            </a:pPr>
+            <a:r>
+              <a:rPr>
+                <a:latin typeface="Gill Sans MT"/>
+                <a:ea typeface="Gill Sans MT"/>
+                <a:cs typeface="Gill Sans MT"/>
+                <a:sym typeface="Gill Sans MT"/>
+              </a:rPr>
+              <a:t>Sorted subarray: </a:t>
+            </a:r>
+            <a:r>
+              <a:t>2, 9, 24, 31</a:t>
+            </a:r>
+          </a:p>
+          <a:p>
+            <a:pPr>
+              <a:spcBef>
+                <a:spcPts val="100"/>
+              </a:spcBef>
+            </a:pPr>
+            <a:r>
+              <a:t>Inversions in Right half: </a:t>
+            </a:r>
+            <a:r>
+              <a:rPr>
+                <a:latin typeface="Courier New"/>
+                <a:ea typeface="Courier New"/>
+                <a:cs typeface="Courier New"/>
+                <a:sym typeface="Courier New"/>
+              </a:rPr>
+              <a:t>13, 36, 28, 7</a:t>
+            </a:r>
+          </a:p>
+          <a:p>
+            <a:pPr lvl="2" marL="0" indent="457200">
+              <a:spcBef>
+                <a:spcPts val="100"/>
+              </a:spcBef>
+              <a:buSzTx/>
+              <a:buNone/>
+              <a:defRPr sz="3000">
+                <a:latin typeface="Courier New"/>
+                <a:ea typeface="Courier New"/>
+                <a:cs typeface="Courier New"/>
+                <a:sym typeface="Courier New"/>
+              </a:defRPr>
+            </a:pPr>
+            <a:r>
+              <a:t>(4): 13-7, 36-28, 36-7, 28-7</a:t>
+            </a:r>
+          </a:p>
+          <a:p>
+            <a:pPr lvl="2" marL="0" indent="457200">
+              <a:spcBef>
+                <a:spcPts val="100"/>
+              </a:spcBef>
+              <a:buSzTx/>
+              <a:buNone/>
+              <a:defRPr sz="3200">
+                <a:latin typeface="Courier New"/>
+                <a:ea typeface="Courier New"/>
+                <a:cs typeface="Courier New"/>
+                <a:sym typeface="Courier New"/>
+              </a:defRPr>
+            </a:pPr>
+            <a:r>
+              <a:rPr>
+                <a:latin typeface="Gill Sans MT"/>
+                <a:ea typeface="Gill Sans MT"/>
+                <a:cs typeface="Gill Sans MT"/>
+                <a:sym typeface="Gill Sans MT"/>
+              </a:rPr>
+              <a:t>Sorted subarray: </a:t>
+            </a:r>
+            <a:r>
+              <a:t>7, 13, 28, 36</a:t>
+            </a:r>
+          </a:p>
+          <a:p>
+            <a:pPr>
+              <a:spcBef>
+                <a:spcPts val="100"/>
+              </a:spcBef>
+            </a:pPr>
+            <a:r>
+              <a:t>Inversions from left half to right half</a:t>
+            </a:r>
+          </a:p>
+          <a:p>
+            <a:pPr lvl="2" marL="0" indent="457200">
+              <a:spcBef>
+                <a:spcPts val="100"/>
+              </a:spcBef>
+              <a:buSzTx/>
+              <a:buNone/>
+              <a:defRPr sz="3200">
+                <a:latin typeface="Courier New"/>
+                <a:ea typeface="Courier New"/>
+                <a:cs typeface="Courier New"/>
+                <a:sym typeface="Courier New"/>
+              </a:defRPr>
+            </a:pPr>
+            <a:r>
+              <a:t>2,9,24,31 —— 7,13,28,36</a:t>
+            </a:r>
+          </a:p>
+          <a:p>
+            <a:pPr lvl="1" marL="0" indent="228600">
+              <a:spcBef>
+                <a:spcPts val="100"/>
+              </a:spcBef>
+              <a:buSzTx/>
+              <a:buNone/>
+              <a:defRPr>
+                <a:latin typeface="Courier New"/>
+                <a:ea typeface="Courier New"/>
+                <a:cs typeface="Courier New"/>
+                <a:sym typeface="Courier New"/>
+              </a:defRPr>
+            </a:pPr>
+            <a:r>
+              <a:t>(6): 9-7,24-7,24-13,31-7,31-13,31-28</a:t>
+            </a:r>
+          </a:p>
+          <a:p>
+            <a:pPr lvl="2" marL="0" indent="457200">
+              <a:spcBef>
+                <a:spcPts val="100"/>
+              </a:spcBef>
+              <a:buSzTx/>
+              <a:buNone/>
+              <a:defRPr sz="3000">
+                <a:latin typeface="Courier New"/>
+                <a:ea typeface="Courier New"/>
+                <a:cs typeface="Courier New"/>
+                <a:sym typeface="Courier New"/>
+              </a:defRPr>
+            </a:pPr>
+            <a:r>
+              <a:rPr>
+                <a:latin typeface="Gill Sans MT"/>
+                <a:ea typeface="Gill Sans MT"/>
+                <a:cs typeface="Gill Sans MT"/>
+                <a:sym typeface="Gill Sans MT"/>
+              </a:rPr>
+              <a:t>Total inversions: </a:t>
+            </a:r>
+            <a:r>
+              <a:t>4+4+6=14</a:t>
+            </a:r>
+          </a:p>
+          <a:p>
+            <a:pPr marL="361156" indent="-321468">
+              <a:spcBef>
+                <a:spcPts val="100"/>
+              </a:spcBef>
+              <a:defRPr sz="3000">
+                <a:latin typeface="Gill Sans MT"/>
+                <a:ea typeface="Gill Sans MT"/>
+                <a:cs typeface="Gill Sans MT"/>
+                <a:sym typeface="Gill Sans MT"/>
+              </a:defRPr>
+            </a:pPr>
+            <a:r>
+              <a:t>Use Merge and count approach (Divide &amp; Conq)</a:t>
+            </a:r>
+          </a:p>
+        </p:txBody>
+      </p:sp>
+      <p:sp>
+        <p:nvSpPr>
+          <p:cNvPr id="305" name="Slide Number"/>
+          <p:cNvSpPr txBox="1"/>
+          <p:nvPr>
+            <p:ph type="sldNum" sz="quarter" idx="2"/>
+          </p:nvPr>
+        </p:nvSpPr>
+        <p:spPr>
+          <a:prstGeom prst="rect">
+            <a:avLst/>
+          </a:prstGeom>
+          <a:extLst>
+            <a:ext uri="{C572A759-6A51-4108-AA02-DFA0A04FC94B}">
+              <ma14:wrappingTextBoxFlag xmlns:ma14="http://schemas.microsoft.com/office/mac/drawingml/2011/main" val="1"/>
+            </a:ext>
+          </a:extLst>
+        </p:spPr>
+        <p:txBody>
+          <a:bodyPr/>
+          <a:lstStyle/>
+          <a:p>
+            <a:pPr/>
+            <a:fld id="{86CB4B4D-7CA3-9044-876B-883B54F8677D}" type="slidenum"/>
+          </a:p>
+        </p:txBody>
+      </p:sp>
+      <p:sp>
+        <p:nvSpPr>
+          <p:cNvPr id="306" name="DAA/Divide and Conquer"/>
+          <p:cNvSpPr txBox="1"/>
+          <p:nvPr/>
+        </p:nvSpPr>
+        <p:spPr>
+          <a:xfrm>
+            <a:off x="423212" y="6963885"/>
+            <a:ext cx="3371712" cy="431552"/>
+          </a:xfrm>
+          <a:prstGeom prst="rect">
+            <a:avLst/>
+          </a:prstGeom>
+          <a:ln w="12700">
+            <a:miter lim="400000"/>
+          </a:ln>
+          <a:extLst>
+            <a:ext uri="{C572A759-6A51-4108-AA02-DFA0A04FC94B}">
+              <ma14:wrappingTextBoxFlag xmlns:ma14="http://schemas.microsoft.com/office/mac/drawingml/2011/main" val="1"/>
+            </a:ext>
+          </a:extLst>
+        </p:spPr>
+        <p:txBody>
+          <a:bodyPr wrap="none" lIns="50800" tIns="50800" rIns="50800" bIns="50800" anchor="ctr">
+            <a:spAutoFit/>
+          </a:bodyPr>
+          <a:lstStyle>
+            <a:lvl1pPr>
+              <a:defRPr sz="2400"/>
+            </a:lvl1pPr>
+          </a:lstStyle>
+          <a:p>
+            <a:pPr/>
+            <a:r>
+              <a:t>DAA/Divide and Conquer</a:t>
+            </a:r>
+          </a:p>
+        </p:txBody>
+      </p:sp>
+      <p:sp>
+        <p:nvSpPr>
+          <p:cNvPr id="307" name="RPR/"/>
           <p:cNvSpPr txBox="1"/>
           <p:nvPr/>
         </p:nvSpPr>
@@ -18683,53 +19524,53 @@
       </p:par>
     </p:tnLst>
     <p:bldLst>
+      <p:bldP build="whole" bldLvl="1" animBg="1" rev="0" advAuto="0" spid="162" grpId="46"/>
+      <p:bldP build="whole" bldLvl="1" animBg="1" rev="0" advAuto="0" spid="110" grpId="9"/>
+      <p:bldP build="whole" bldLvl="1" animBg="1" rev="0" advAuto="0" spid="168" grpId="50"/>
+      <p:bldP build="whole" bldLvl="1" animBg="1" rev="0" advAuto="0" spid="174" grpId="54"/>
+      <p:bldP build="whole" bldLvl="1" animBg="1" rev="0" advAuto="0" spid="120" grpId="12"/>
+      <p:bldP build="whole" bldLvl="1" animBg="1" rev="0" advAuto="0" spid="132" grpId="33"/>
+      <p:bldP build="whole" bldLvl="1" animBg="1" rev="0" advAuto="0" spid="176" grpId="13"/>
+      <p:bldP build="whole" bldLvl="1" animBg="1" rev="0" advAuto="0" spid="141" grpId="35"/>
+      <p:bldP build="whole" bldLvl="1" animBg="1" rev="0" advAuto="0" spid="87" grpId="2"/>
+      <p:bldP build="whole" bldLvl="1" animBg="1" rev="0" advAuto="0" spid="125" grpId="27"/>
+      <p:bldP build="whole" bldLvl="1" animBg="1" rev="0" advAuto="0" spid="150" grpId="52"/>
+      <p:bldP build="whole" bldLvl="1" animBg="1" rev="0" advAuto="0" spid="126" grpId="29"/>
+      <p:bldP build="whole" bldLvl="1" animBg="1" rev="0" advAuto="0" spid="180" grpId="23"/>
+      <p:bldP build="whole" bldLvl="1" animBg="1" rev="0" advAuto="0" spid="121" grpId="17"/>
+      <p:bldP build="whole" bldLvl="1" animBg="1" rev="0" advAuto="0" spid="183" grpId="39"/>
+      <p:bldP build="whole" bldLvl="1" animBg="1" rev="0" advAuto="0" spid="156" grpId="42"/>
+      <p:bldP build="whole" bldLvl="1" animBg="1" rev="0" advAuto="0" spid="129" grpId="30"/>
+      <p:bldP build="whole" bldLvl="1" animBg="1" rev="0" advAuto="0" spid="177" grpId="16"/>
+      <p:bldP build="whole" bldLvl="1" animBg="1" rev="0" advAuto="0" spid="113" grpId="15"/>
+      <p:bldP build="whole" bldLvl="1" animBg="1" rev="0" advAuto="0" spid="144" grpId="36"/>
+      <p:bldP build="whole" bldLvl="1" animBg="1" rev="0" advAuto="0" spid="184" grpId="38"/>
+      <p:bldP build="whole" bldLvl="1" animBg="1" rev="0" advAuto="0" spid="153" grpId="40"/>
+      <p:bldP build="whole" bldLvl="1" animBg="1" rev="0" advAuto="0" spid="115" grpId="20"/>
+      <p:bldP build="whole" bldLvl="1" animBg="1" rev="0" advAuto="0" spid="181" grpId="26"/>
+      <p:bldP build="whole" bldLvl="1" animBg="1" rev="0" advAuto="0" spid="101" grpId="5"/>
+      <p:bldP build="whole" bldLvl="1" animBg="1" rev="0" advAuto="0" spid="88" grpId="1"/>
+      <p:bldP build="whole" bldLvl="1" animBg="1" rev="0" advAuto="0" spid="94" grpId="3"/>
+      <p:bldP build="whole" bldLvl="1" animBg="1" rev="0" advAuto="0" spid="138" grpId="34"/>
+      <p:bldP build="whole" bldLvl="1" animBg="1" rev="0" advAuto="0" spid="117" grpId="25"/>
+      <p:bldP build="whole" bldLvl="1" animBg="1" rev="0" advAuto="0" spid="159" grpId="44"/>
+      <p:bldP build="whole" bldLvl="1" animBg="1" rev="0" advAuto="0" spid="111" grpId="10"/>
+      <p:bldP build="whole" bldLvl="1" animBg="1" rev="0" advAuto="0" spid="178" grpId="18"/>
+      <p:bldP build="whole" bldLvl="1" animBg="1" rev="0" advAuto="0" spid="122" grpId="19"/>
+      <p:bldP build="whole" bldLvl="1" animBg="1" rev="0" advAuto="0" spid="135" grpId="31"/>
+      <p:bldP build="whole" bldLvl="1" animBg="1" rev="0" advAuto="0" spid="171" grpId="32"/>
+      <p:bldP build="whole" bldLvl="1" animBg="1" rev="0" advAuto="0" spid="123" grpId="24"/>
+      <p:bldP build="whole" bldLvl="1" animBg="1" rev="0" advAuto="0" spid="95" grpId="4"/>
       <p:bldP build="whole" bldLvl="1" animBg="1" rev="0" advAuto="0" spid="124" grpId="22"/>
-      <p:bldP build="whole" bldLvl="1" animBg="1" rev="0" advAuto="0" spid="129" grpId="30"/>
+      <p:bldP build="whole" bldLvl="1" animBg="1" rev="0" advAuto="0" spid="175" grpId="11"/>
+      <p:bldP build="whole" bldLvl="1" animBg="1" rev="0" advAuto="0" spid="182" grpId="28"/>
+      <p:bldP build="whole" bldLvl="1" animBg="1" rev="0" advAuto="0" spid="119" grpId="14"/>
+      <p:bldP build="whole" bldLvl="1" animBg="1" rev="0" advAuto="0" spid="97" grpId="7"/>
+      <p:bldP build="whole" bldLvl="1" animBg="1" rev="0" advAuto="0" spid="147" grpId="37"/>
+      <p:bldP build="whole" bldLvl="1" animBg="1" rev="0" advAuto="0" spid="107" grpId="8"/>
       <p:bldP build="whole" bldLvl="1" animBg="1" rev="0" advAuto="0" spid="104" grpId="6"/>
-      <p:bldP build="whole" bldLvl="1" animBg="1" rev="0" advAuto="0" spid="107" grpId="8"/>
-      <p:bldP build="whole" bldLvl="1" animBg="1" rev="0" advAuto="0" spid="138" grpId="34"/>
-      <p:bldP build="whole" bldLvl="1" animBg="1" rev="0" advAuto="0" spid="184" grpId="38"/>
-      <p:bldP build="whole" bldLvl="1" animBg="1" rev="0" advAuto="0" spid="111" grpId="10"/>
-      <p:bldP build="whole" bldLvl="1" animBg="1" rev="0" advAuto="0" spid="88" grpId="1"/>
-      <p:bldP build="whole" bldLvl="1" animBg="1" rev="0" advAuto="0" spid="87" grpId="2"/>
-      <p:bldP build="whole" bldLvl="1" animBg="1" rev="0" advAuto="0" spid="147" grpId="37"/>
-      <p:bldP build="whole" bldLvl="1" animBg="1" rev="0" advAuto="0" spid="101" grpId="5"/>
-      <p:bldP build="whole" bldLvl="1" animBg="1" rev="0" advAuto="0" spid="153" grpId="40"/>
+      <p:bldP build="whole" bldLvl="1" animBg="1" rev="0" advAuto="0" spid="179" grpId="21"/>
       <p:bldP build="whole" bldLvl="1" animBg="1" rev="0" advAuto="0" spid="165" grpId="48"/>
-      <p:bldP build="whole" bldLvl="1" animBg="1" rev="0" advAuto="0" spid="141" grpId="35"/>
-      <p:bldP build="whole" bldLvl="1" animBg="1" rev="0" advAuto="0" spid="150" grpId="52"/>
-      <p:bldP build="whole" bldLvl="1" animBg="1" rev="0" advAuto="0" spid="94" grpId="3"/>
-      <p:bldP build="whole" bldLvl="1" animBg="1" rev="0" advAuto="0" spid="171" grpId="32"/>
-      <p:bldP build="whole" bldLvl="1" animBg="1" rev="0" advAuto="0" spid="95" grpId="4"/>
-      <p:bldP build="whole" bldLvl="1" animBg="1" rev="0" advAuto="0" spid="110" grpId="9"/>
-      <p:bldP build="whole" bldLvl="1" animBg="1" rev="0" advAuto="0" spid="183" grpId="39"/>
-      <p:bldP build="whole" bldLvl="1" animBg="1" rev="0" advAuto="0" spid="176" grpId="13"/>
-      <p:bldP build="whole" bldLvl="1" animBg="1" rev="0" advAuto="0" spid="174" grpId="54"/>
-      <p:bldP build="whole" bldLvl="1" animBg="1" rev="0" advAuto="0" spid="178" grpId="18"/>
-      <p:bldP build="whole" bldLvl="1" animBg="1" rev="0" advAuto="0" spid="97" grpId="7"/>
-      <p:bldP build="whole" bldLvl="1" animBg="1" rev="0" advAuto="0" spid="126" grpId="29"/>
-      <p:bldP build="whole" bldLvl="1" animBg="1" rev="0" advAuto="0" spid="175" grpId="11"/>
-      <p:bldP build="whole" bldLvl="1" animBg="1" rev="0" advAuto="0" spid="122" grpId="19"/>
-      <p:bldP build="whole" bldLvl="1" animBg="1" rev="0" advAuto="0" spid="181" grpId="26"/>
-      <p:bldP build="whole" bldLvl="1" animBg="1" rev="0" advAuto="0" spid="121" grpId="17"/>
-      <p:bldP build="whole" bldLvl="1" animBg="1" rev="0" advAuto="0" spid="156" grpId="42"/>
-      <p:bldP build="whole" bldLvl="1" animBg="1" rev="0" advAuto="0" spid="162" grpId="46"/>
-      <p:bldP build="whole" bldLvl="1" animBg="1" rev="0" advAuto="0" spid="168" grpId="50"/>
-      <p:bldP build="whole" bldLvl="1" animBg="1" rev="0" advAuto="0" spid="135" grpId="31"/>
-      <p:bldP build="whole" bldLvl="1" animBg="1" rev="0" advAuto="0" spid="115" grpId="20"/>
-      <p:bldP build="whole" bldLvl="1" animBg="1" rev="0" advAuto="0" spid="117" grpId="25"/>
-      <p:bldP build="whole" bldLvl="1" animBg="1" rev="0" advAuto="0" spid="182" grpId="28"/>
-      <p:bldP build="whole" bldLvl="1" animBg="1" rev="0" advAuto="0" spid="177" grpId="16"/>
-      <p:bldP build="whole" bldLvl="1" animBg="1" rev="0" advAuto="0" spid="120" grpId="12"/>
-      <p:bldP build="whole" bldLvl="1" animBg="1" rev="0" advAuto="0" spid="159" grpId="44"/>
-      <p:bldP build="whole" bldLvl="1" animBg="1" rev="0" advAuto="0" spid="180" grpId="23"/>
-      <p:bldP build="whole" bldLvl="1" animBg="1" rev="0" advAuto="0" spid="123" grpId="24"/>
-      <p:bldP build="whole" bldLvl="1" animBg="1" rev="0" advAuto="0" spid="119" grpId="14"/>
-      <p:bldP build="whole" bldLvl="1" animBg="1" rev="0" advAuto="0" spid="113" grpId="15"/>
-      <p:bldP build="whole" bldLvl="1" animBg="1" rev="0" advAuto="0" spid="125" grpId="27"/>
-      <p:bldP build="whole" bldLvl="1" animBg="1" rev="0" advAuto="0" spid="144" grpId="36"/>
-      <p:bldP build="whole" bldLvl="1" animBg="1" rev="0" advAuto="0" spid="179" grpId="21"/>
-      <p:bldP build="whole" bldLvl="1" animBg="1" rev="0" advAuto="0" spid="132" grpId="33"/>
     </p:bldLst>
   </p:timing>
 </p:sld>

</xml_diff>